<commit_message>
add comment on week6
</commit_message>
<xml_diff>
--- a/doc/Cousera_Functional Programming parctice.pptx
+++ b/doc/Cousera_Functional Programming parctice.pptx
@@ -41,6 +41,13 @@
     <p:sldId id="289" r:id="rId35"/>
     <p:sldId id="290" r:id="rId36"/>
     <p:sldId id="291" r:id="rId37"/>
+    <p:sldId id="292" r:id="rId38"/>
+    <p:sldId id="293" r:id="rId39"/>
+    <p:sldId id="294" r:id="rId40"/>
+    <p:sldId id="295" r:id="rId41"/>
+    <p:sldId id="296" r:id="rId42"/>
+    <p:sldId id="297" r:id="rId43"/>
+    <p:sldId id="298" r:id="rId44"/>
   </p:sldIdLst>
   <p:sldSz cx="9144000" cy="6858000" type="screen4x3"/>
   <p:notesSz cx="6858000" cy="9144000"/>
@@ -323,7 +330,7 @@
           <a:p>
             <a:fld id="{7035F8CA-3E03-40E9-91B9-44BB9DCBBB8B}" type="datetimeFigureOut">
               <a:rPr lang="ko-KR" altLang="en-US" smtClean="0"/>
-              <a:t>2016-08-04</a:t>
+              <a:t>2016-08-05</a:t>
             </a:fld>
             <a:endParaRPr lang="ko-KR" altLang="en-US"/>
           </a:p>
@@ -493,7 +500,7 @@
           <a:p>
             <a:fld id="{7035F8CA-3E03-40E9-91B9-44BB9DCBBB8B}" type="datetimeFigureOut">
               <a:rPr lang="ko-KR" altLang="en-US" smtClean="0"/>
-              <a:t>2016-08-04</a:t>
+              <a:t>2016-08-05</a:t>
             </a:fld>
             <a:endParaRPr lang="ko-KR" altLang="en-US"/>
           </a:p>
@@ -673,7 +680,7 @@
           <a:p>
             <a:fld id="{7035F8CA-3E03-40E9-91B9-44BB9DCBBB8B}" type="datetimeFigureOut">
               <a:rPr lang="ko-KR" altLang="en-US" smtClean="0"/>
-              <a:t>2016-08-04</a:t>
+              <a:t>2016-08-05</a:t>
             </a:fld>
             <a:endParaRPr lang="ko-KR" altLang="en-US"/>
           </a:p>
@@ -843,7 +850,7 @@
           <a:p>
             <a:fld id="{7035F8CA-3E03-40E9-91B9-44BB9DCBBB8B}" type="datetimeFigureOut">
               <a:rPr lang="ko-KR" altLang="en-US" smtClean="0"/>
-              <a:t>2016-08-04</a:t>
+              <a:t>2016-08-05</a:t>
             </a:fld>
             <a:endParaRPr lang="ko-KR" altLang="en-US"/>
           </a:p>
@@ -1089,7 +1096,7 @@
           <a:p>
             <a:fld id="{7035F8CA-3E03-40E9-91B9-44BB9DCBBB8B}" type="datetimeFigureOut">
               <a:rPr lang="ko-KR" altLang="en-US" smtClean="0"/>
-              <a:t>2016-08-04</a:t>
+              <a:t>2016-08-05</a:t>
             </a:fld>
             <a:endParaRPr lang="ko-KR" altLang="en-US"/>
           </a:p>
@@ -1377,7 +1384,7 @@
           <a:p>
             <a:fld id="{7035F8CA-3E03-40E9-91B9-44BB9DCBBB8B}" type="datetimeFigureOut">
               <a:rPr lang="ko-KR" altLang="en-US" smtClean="0"/>
-              <a:t>2016-08-04</a:t>
+              <a:t>2016-08-05</a:t>
             </a:fld>
             <a:endParaRPr lang="ko-KR" altLang="en-US"/>
           </a:p>
@@ -1799,7 +1806,7 @@
           <a:p>
             <a:fld id="{7035F8CA-3E03-40E9-91B9-44BB9DCBBB8B}" type="datetimeFigureOut">
               <a:rPr lang="ko-KR" altLang="en-US" smtClean="0"/>
-              <a:t>2016-08-04</a:t>
+              <a:t>2016-08-05</a:t>
             </a:fld>
             <a:endParaRPr lang="ko-KR" altLang="en-US"/>
           </a:p>
@@ -1917,7 +1924,7 @@
           <a:p>
             <a:fld id="{7035F8CA-3E03-40E9-91B9-44BB9DCBBB8B}" type="datetimeFigureOut">
               <a:rPr lang="ko-KR" altLang="en-US" smtClean="0"/>
-              <a:t>2016-08-04</a:t>
+              <a:t>2016-08-05</a:t>
             </a:fld>
             <a:endParaRPr lang="ko-KR" altLang="en-US"/>
           </a:p>
@@ -2012,7 +2019,7 @@
           <a:p>
             <a:fld id="{7035F8CA-3E03-40E9-91B9-44BB9DCBBB8B}" type="datetimeFigureOut">
               <a:rPr lang="ko-KR" altLang="en-US" smtClean="0"/>
-              <a:t>2016-08-04</a:t>
+              <a:t>2016-08-05</a:t>
             </a:fld>
             <a:endParaRPr lang="ko-KR" altLang="en-US"/>
           </a:p>
@@ -2289,7 +2296,7 @@
           <a:p>
             <a:fld id="{7035F8CA-3E03-40E9-91B9-44BB9DCBBB8B}" type="datetimeFigureOut">
               <a:rPr lang="ko-KR" altLang="en-US" smtClean="0"/>
-              <a:t>2016-08-04</a:t>
+              <a:t>2016-08-05</a:t>
             </a:fld>
             <a:endParaRPr lang="ko-KR" altLang="en-US"/>
           </a:p>
@@ -2542,7 +2549,7 @@
           <a:p>
             <a:fld id="{7035F8CA-3E03-40E9-91B9-44BB9DCBBB8B}" type="datetimeFigureOut">
               <a:rPr lang="ko-KR" altLang="en-US" smtClean="0"/>
-              <a:t>2016-08-04</a:t>
+              <a:t>2016-08-05</a:t>
             </a:fld>
             <a:endParaRPr lang="ko-KR" altLang="en-US"/>
           </a:p>
@@ -2755,7 +2762,7 @@
           <a:p>
             <a:fld id="{7035F8CA-3E03-40E9-91B9-44BB9DCBBB8B}" type="datetimeFigureOut">
               <a:rPr lang="ko-KR" altLang="en-US" smtClean="0"/>
-              <a:t>2016-08-04</a:t>
+              <a:t>2016-08-05</a:t>
             </a:fld>
             <a:endParaRPr lang="ko-KR" altLang="en-US"/>
           </a:p>
@@ -8321,6 +8328,341 @@
 </p:sld>
 </file>
 
+<file path=ppt/slides/slide37.xml><?xml version="1.0" encoding="utf-8"?>
+<p:sld xmlns:a="http://schemas.openxmlformats.org/drawingml/2006/main" xmlns:r="http://schemas.openxmlformats.org/officeDocument/2006/relationships" xmlns:p="http://schemas.openxmlformats.org/presentationml/2006/main">
+  <p:cSld>
+    <p:spTree>
+      <p:nvGrpSpPr>
+        <p:cNvPr id="1" name=""/>
+        <p:cNvGrpSpPr/>
+        <p:nvPr/>
+      </p:nvGrpSpPr>
+      <p:grpSpPr>
+        <a:xfrm>
+          <a:off x="0" y="0"/>
+          <a:ext cx="0" cy="0"/>
+          <a:chOff x="0" y="0"/>
+          <a:chExt cx="0" cy="0"/>
+        </a:xfrm>
+      </p:grpSpPr>
+      <p:sp>
+        <p:nvSpPr>
+          <p:cNvPr id="2" name="제목 1"/>
+          <p:cNvSpPr>
+            <a:spLocks noGrp="1"/>
+          </p:cNvSpPr>
+          <p:nvPr>
+            <p:ph type="title"/>
+          </p:nvPr>
+        </p:nvSpPr>
+        <p:spPr/>
+        <p:txBody>
+          <a:bodyPr/>
+          <a:lstStyle/>
+          <a:p>
+            <a:r>
+              <a:rPr lang="en-US" altLang="ko-KR" dirty="0" err="1" smtClean="0"/>
+              <a:t>ReduceLeft</a:t>
+            </a:r>
+            <a:r>
+              <a:rPr lang="ko-KR" altLang="en-US" dirty="0" smtClean="0"/>
+              <a:t>의 도식화</a:t>
+            </a:r>
+            <a:endParaRPr lang="ko-KR" altLang="en-US" dirty="0"/>
+          </a:p>
+        </p:txBody>
+      </p:sp>
+      <p:pic>
+        <p:nvPicPr>
+          <p:cNvPr id="1026" name="Picture 2"/>
+          <p:cNvPicPr>
+            <a:picLocks noGrp="1" noChangeAspect="1" noChangeArrowheads="1"/>
+          </p:cNvPicPr>
+          <p:nvPr>
+            <p:ph idx="1"/>
+          </p:nvPr>
+        </p:nvPicPr>
+        <p:blipFill>
+          <a:blip r:embed="rId2">
+            <a:extLst>
+              <a:ext uri="{28A0092B-C50C-407E-A947-70E740481C1C}">
+                <a14:useLocalDpi xmlns:a14="http://schemas.microsoft.com/office/drawing/2010/main" val="0"/>
+              </a:ext>
+            </a:extLst>
+          </a:blip>
+          <a:srcRect/>
+          <a:stretch>
+            <a:fillRect/>
+          </a:stretch>
+        </p:blipFill>
+        <p:spPr bwMode="auto">
+          <a:xfrm>
+            <a:off x="1481137" y="2610644"/>
+            <a:ext cx="6181725" cy="2505075"/>
+          </a:xfrm>
+          <a:prstGeom prst="rect">
+            <a:avLst/>
+          </a:prstGeom>
+          <a:noFill/>
+          <a:ln>
+            <a:noFill/>
+          </a:ln>
+          <a:extLst>
+            <a:ext uri="{909E8E84-426E-40DD-AFC4-6F175D3DCCD1}">
+              <a14:hiddenFill xmlns:a14="http://schemas.microsoft.com/office/drawing/2010/main">
+                <a:solidFill>
+                  <a:schemeClr val="accent1"/>
+                </a:solidFill>
+              </a14:hiddenFill>
+            </a:ext>
+            <a:ext uri="{91240B29-F687-4F45-9708-019B960494DF}">
+              <a14:hiddenLine xmlns:a14="http://schemas.microsoft.com/office/drawing/2010/main" w="9525">
+                <a:solidFill>
+                  <a:schemeClr val="tx1"/>
+                </a:solidFill>
+                <a:miter lim="800000"/>
+                <a:headEnd/>
+                <a:tailEnd/>
+              </a14:hiddenLine>
+            </a:ext>
+          </a:extLst>
+        </p:spPr>
+      </p:pic>
+    </p:spTree>
+    <p:extLst>
+      <p:ext uri="{BB962C8B-B14F-4D97-AF65-F5344CB8AC3E}">
+        <p14:creationId xmlns:p14="http://schemas.microsoft.com/office/powerpoint/2010/main" val="3846442760"/>
+      </p:ext>
+    </p:extLst>
+  </p:cSld>
+  <p:clrMapOvr>
+    <a:masterClrMapping/>
+  </p:clrMapOvr>
+</p:sld>
+</file>
+
+<file path=ppt/slides/slide38.xml><?xml version="1.0" encoding="utf-8"?>
+<p:sld xmlns:a="http://schemas.openxmlformats.org/drawingml/2006/main" xmlns:r="http://schemas.openxmlformats.org/officeDocument/2006/relationships" xmlns:p="http://schemas.openxmlformats.org/presentationml/2006/main">
+  <p:cSld>
+    <p:spTree>
+      <p:nvGrpSpPr>
+        <p:cNvPr id="1" name=""/>
+        <p:cNvGrpSpPr/>
+        <p:nvPr/>
+      </p:nvGrpSpPr>
+      <p:grpSpPr>
+        <a:xfrm>
+          <a:off x="0" y="0"/>
+          <a:ext cx="0" cy="0"/>
+          <a:chOff x="0" y="0"/>
+          <a:chExt cx="0" cy="0"/>
+        </a:xfrm>
+      </p:grpSpPr>
+      <p:sp>
+        <p:nvSpPr>
+          <p:cNvPr id="2" name="제목 1"/>
+          <p:cNvSpPr>
+            <a:spLocks noGrp="1"/>
+          </p:cNvSpPr>
+          <p:nvPr>
+            <p:ph type="title"/>
+          </p:nvPr>
+        </p:nvSpPr>
+        <p:spPr/>
+        <p:txBody>
+          <a:bodyPr/>
+          <a:lstStyle/>
+          <a:p>
+            <a:r>
+              <a:rPr lang="en-US" altLang="ko-KR" dirty="0" err="1" smtClean="0"/>
+              <a:t>FoldLeft</a:t>
+            </a:r>
+            <a:r>
+              <a:rPr lang="en-US" altLang="ko-KR" dirty="0" smtClean="0"/>
+              <a:t> </a:t>
+            </a:r>
+            <a:r>
+              <a:rPr lang="ko-KR" altLang="en-US" dirty="0" smtClean="0"/>
+              <a:t>도식화</a:t>
+            </a:r>
+            <a:endParaRPr lang="ko-KR" altLang="en-US" dirty="0"/>
+          </a:p>
+        </p:txBody>
+      </p:sp>
+      <p:pic>
+        <p:nvPicPr>
+          <p:cNvPr id="2050" name="Picture 2"/>
+          <p:cNvPicPr>
+            <a:picLocks noGrp="1" noChangeAspect="1" noChangeArrowheads="1"/>
+          </p:cNvPicPr>
+          <p:nvPr>
+            <p:ph idx="1"/>
+          </p:nvPr>
+        </p:nvPicPr>
+        <p:blipFill>
+          <a:blip r:embed="rId2">
+            <a:extLst>
+              <a:ext uri="{28A0092B-C50C-407E-A947-70E740481C1C}">
+                <a14:useLocalDpi xmlns:a14="http://schemas.microsoft.com/office/drawing/2010/main" val="0"/>
+              </a:ext>
+            </a:extLst>
+          </a:blip>
+          <a:srcRect/>
+          <a:stretch>
+            <a:fillRect/>
+          </a:stretch>
+        </p:blipFill>
+        <p:spPr bwMode="auto">
+          <a:xfrm>
+            <a:off x="1228725" y="1648619"/>
+            <a:ext cx="6686550" cy="4429125"/>
+          </a:xfrm>
+          <a:prstGeom prst="rect">
+            <a:avLst/>
+          </a:prstGeom>
+          <a:noFill/>
+          <a:ln>
+            <a:noFill/>
+          </a:ln>
+          <a:extLst>
+            <a:ext uri="{909E8E84-426E-40DD-AFC4-6F175D3DCCD1}">
+              <a14:hiddenFill xmlns:a14="http://schemas.microsoft.com/office/drawing/2010/main">
+                <a:solidFill>
+                  <a:schemeClr val="accent1"/>
+                </a:solidFill>
+              </a14:hiddenFill>
+            </a:ext>
+            <a:ext uri="{91240B29-F687-4F45-9708-019B960494DF}">
+              <a14:hiddenLine xmlns:a14="http://schemas.microsoft.com/office/drawing/2010/main" w="9525">
+                <a:solidFill>
+                  <a:schemeClr val="tx1"/>
+                </a:solidFill>
+                <a:miter lim="800000"/>
+                <a:headEnd/>
+                <a:tailEnd/>
+              </a14:hiddenLine>
+            </a:ext>
+          </a:extLst>
+        </p:spPr>
+      </p:pic>
+    </p:spTree>
+    <p:extLst>
+      <p:ext uri="{BB962C8B-B14F-4D97-AF65-F5344CB8AC3E}">
+        <p14:creationId xmlns:p14="http://schemas.microsoft.com/office/powerpoint/2010/main" val="3205884535"/>
+      </p:ext>
+    </p:extLst>
+  </p:cSld>
+  <p:clrMapOvr>
+    <a:masterClrMapping/>
+  </p:clrMapOvr>
+</p:sld>
+</file>
+
+<file path=ppt/slides/slide39.xml><?xml version="1.0" encoding="utf-8"?>
+<p:sld xmlns:a="http://schemas.openxmlformats.org/drawingml/2006/main" xmlns:r="http://schemas.openxmlformats.org/officeDocument/2006/relationships" xmlns:p="http://schemas.openxmlformats.org/presentationml/2006/main">
+  <p:cSld>
+    <p:spTree>
+      <p:nvGrpSpPr>
+        <p:cNvPr id="1" name=""/>
+        <p:cNvGrpSpPr/>
+        <p:nvPr/>
+      </p:nvGrpSpPr>
+      <p:grpSpPr>
+        <a:xfrm>
+          <a:off x="0" y="0"/>
+          <a:ext cx="0" cy="0"/>
+          <a:chOff x="0" y="0"/>
+          <a:chExt cx="0" cy="0"/>
+        </a:xfrm>
+      </p:grpSpPr>
+      <p:sp>
+        <p:nvSpPr>
+          <p:cNvPr id="2" name="제목 1"/>
+          <p:cNvSpPr>
+            <a:spLocks noGrp="1"/>
+          </p:cNvSpPr>
+          <p:nvPr>
+            <p:ph type="title"/>
+          </p:nvPr>
+        </p:nvSpPr>
+        <p:spPr/>
+        <p:txBody>
+          <a:bodyPr/>
+          <a:lstStyle/>
+          <a:p>
+            <a:endParaRPr lang="ko-KR" altLang="en-US"/>
+          </a:p>
+        </p:txBody>
+      </p:sp>
+      <p:pic>
+        <p:nvPicPr>
+          <p:cNvPr id="3074" name="Picture 2"/>
+          <p:cNvPicPr>
+            <a:picLocks noGrp="1" noChangeAspect="1" noChangeArrowheads="1"/>
+          </p:cNvPicPr>
+          <p:nvPr>
+            <p:ph idx="1"/>
+          </p:nvPr>
+        </p:nvPicPr>
+        <p:blipFill>
+          <a:blip r:embed="rId2">
+            <a:extLst>
+              <a:ext uri="{28A0092B-C50C-407E-A947-70E740481C1C}">
+                <a14:useLocalDpi xmlns:a14="http://schemas.microsoft.com/office/drawing/2010/main" val="0"/>
+              </a:ext>
+            </a:extLst>
+          </a:blip>
+          <a:srcRect/>
+          <a:stretch>
+            <a:fillRect/>
+          </a:stretch>
+        </p:blipFill>
+        <p:spPr bwMode="auto">
+          <a:xfrm>
+            <a:off x="752475" y="1853406"/>
+            <a:ext cx="7639050" cy="4019550"/>
+          </a:xfrm>
+          <a:prstGeom prst="rect">
+            <a:avLst/>
+          </a:prstGeom>
+          <a:noFill/>
+          <a:ln>
+            <a:noFill/>
+          </a:ln>
+          <a:extLst>
+            <a:ext uri="{909E8E84-426E-40DD-AFC4-6F175D3DCCD1}">
+              <a14:hiddenFill xmlns:a14="http://schemas.microsoft.com/office/drawing/2010/main">
+                <a:solidFill>
+                  <a:schemeClr val="accent1"/>
+                </a:solidFill>
+              </a14:hiddenFill>
+            </a:ext>
+            <a:ext uri="{91240B29-F687-4F45-9708-019B960494DF}">
+              <a14:hiddenLine xmlns:a14="http://schemas.microsoft.com/office/drawing/2010/main" w="9525">
+                <a:solidFill>
+                  <a:schemeClr val="tx1"/>
+                </a:solidFill>
+                <a:miter lim="800000"/>
+                <a:headEnd/>
+                <a:tailEnd/>
+              </a14:hiddenLine>
+            </a:ext>
+          </a:extLst>
+        </p:spPr>
+      </p:pic>
+    </p:spTree>
+    <p:extLst>
+      <p:ext uri="{BB962C8B-B14F-4D97-AF65-F5344CB8AC3E}">
+        <p14:creationId xmlns:p14="http://schemas.microsoft.com/office/powerpoint/2010/main" val="1799410856"/>
+      </p:ext>
+    </p:extLst>
+  </p:cSld>
+  <p:clrMapOvr>
+    <a:masterClrMapping/>
+  </p:clrMapOvr>
+</p:sld>
+</file>
+
 <file path=ppt/slides/slide4.xml><?xml version="1.0" encoding="utf-8"?>
 <p:sld xmlns:a="http://schemas.openxmlformats.org/drawingml/2006/main" xmlns:r="http://schemas.openxmlformats.org/officeDocument/2006/relationships" xmlns:p="http://schemas.openxmlformats.org/presentationml/2006/main">
   <p:cSld>
@@ -8474,6 +8816,675 @@
     <p:extLst>
       <p:ext uri="{BB962C8B-B14F-4D97-AF65-F5344CB8AC3E}">
         <p14:creationId xmlns:p14="http://schemas.microsoft.com/office/powerpoint/2010/main" val="1193290830"/>
+      </p:ext>
+    </p:extLst>
+  </p:cSld>
+  <p:clrMapOvr>
+    <a:masterClrMapping/>
+  </p:clrMapOvr>
+</p:sld>
+</file>
+
+<file path=ppt/slides/slide40.xml><?xml version="1.0" encoding="utf-8"?>
+<p:sld xmlns:a="http://schemas.openxmlformats.org/drawingml/2006/main" xmlns:r="http://schemas.openxmlformats.org/officeDocument/2006/relationships" xmlns:p="http://schemas.openxmlformats.org/presentationml/2006/main">
+  <p:cSld>
+    <p:spTree>
+      <p:nvGrpSpPr>
+        <p:cNvPr id="1" name=""/>
+        <p:cNvGrpSpPr/>
+        <p:nvPr/>
+      </p:nvGrpSpPr>
+      <p:grpSpPr>
+        <a:xfrm>
+          <a:off x="0" y="0"/>
+          <a:ext cx="0" cy="0"/>
+          <a:chOff x="0" y="0"/>
+          <a:chExt cx="0" cy="0"/>
+        </a:xfrm>
+      </p:grpSpPr>
+      <p:sp>
+        <p:nvSpPr>
+          <p:cNvPr id="2" name="제목 1"/>
+          <p:cNvSpPr>
+            <a:spLocks noGrp="1"/>
+          </p:cNvSpPr>
+          <p:nvPr>
+            <p:ph type="title"/>
+          </p:nvPr>
+        </p:nvSpPr>
+        <p:spPr/>
+        <p:txBody>
+          <a:bodyPr/>
+          <a:lstStyle/>
+          <a:p>
+            <a:endParaRPr lang="ko-KR" altLang="en-US"/>
+          </a:p>
+        </p:txBody>
+      </p:sp>
+      <p:pic>
+        <p:nvPicPr>
+          <p:cNvPr id="4098" name="Picture 2"/>
+          <p:cNvPicPr>
+            <a:picLocks noGrp="1" noChangeAspect="1" noChangeArrowheads="1"/>
+          </p:cNvPicPr>
+          <p:nvPr>
+            <p:ph idx="1"/>
+          </p:nvPr>
+        </p:nvPicPr>
+        <p:blipFill>
+          <a:blip r:embed="rId2">
+            <a:extLst>
+              <a:ext uri="{28A0092B-C50C-407E-A947-70E740481C1C}">
+                <a14:useLocalDpi xmlns:a14="http://schemas.microsoft.com/office/drawing/2010/main" val="0"/>
+              </a:ext>
+            </a:extLst>
+          </a:blip>
+          <a:srcRect/>
+          <a:stretch>
+            <a:fillRect/>
+          </a:stretch>
+        </p:blipFill>
+        <p:spPr bwMode="auto">
+          <a:xfrm>
+            <a:off x="933450" y="1829594"/>
+            <a:ext cx="7277100" cy="4067175"/>
+          </a:xfrm>
+          <a:prstGeom prst="rect">
+            <a:avLst/>
+          </a:prstGeom>
+          <a:noFill/>
+          <a:ln>
+            <a:noFill/>
+          </a:ln>
+          <a:extLst>
+            <a:ext uri="{909E8E84-426E-40DD-AFC4-6F175D3DCCD1}">
+              <a14:hiddenFill xmlns:a14="http://schemas.microsoft.com/office/drawing/2010/main">
+                <a:solidFill>
+                  <a:schemeClr val="accent1"/>
+                </a:solidFill>
+              </a14:hiddenFill>
+            </a:ext>
+            <a:ext uri="{91240B29-F687-4F45-9708-019B960494DF}">
+              <a14:hiddenLine xmlns:a14="http://schemas.microsoft.com/office/drawing/2010/main" w="9525">
+                <a:solidFill>
+                  <a:schemeClr val="tx1"/>
+                </a:solidFill>
+                <a:miter lim="800000"/>
+                <a:headEnd/>
+                <a:tailEnd/>
+              </a14:hiddenLine>
+            </a:ext>
+          </a:extLst>
+        </p:spPr>
+      </p:pic>
+      <p:sp>
+        <p:nvSpPr>
+          <p:cNvPr id="4" name="직사각형 3"/>
+          <p:cNvSpPr/>
+          <p:nvPr/>
+        </p:nvSpPr>
+        <p:spPr>
+          <a:xfrm>
+            <a:off x="2123728" y="5949280"/>
+            <a:ext cx="1944216" cy="576064"/>
+          </a:xfrm>
+          <a:prstGeom prst="rect">
+            <a:avLst/>
+          </a:prstGeom>
+          <a:solidFill>
+            <a:schemeClr val="bg1"/>
+          </a:solidFill>
+          <a:ln>
+            <a:solidFill>
+              <a:schemeClr val="tx1"/>
+            </a:solidFill>
+          </a:ln>
+        </p:spPr>
+        <p:style>
+          <a:lnRef idx="2">
+            <a:schemeClr val="accent1">
+              <a:shade val="50000"/>
+            </a:schemeClr>
+          </a:lnRef>
+          <a:fillRef idx="1">
+            <a:schemeClr val="accent1"/>
+          </a:fillRef>
+          <a:effectRef idx="0">
+            <a:schemeClr val="accent1"/>
+          </a:effectRef>
+          <a:fontRef idx="minor">
+            <a:schemeClr val="lt1"/>
+          </a:fontRef>
+        </p:style>
+        <p:txBody>
+          <a:bodyPr lIns="72000" rIns="72000" rtlCol="0" anchor="ctr"/>
+          <a:lstStyle/>
+          <a:p>
+            <a:pPr algn="ctr"/>
+            <a:r>
+              <a:rPr lang="en-US" altLang="ko-KR" sz="1400" dirty="0" err="1" smtClean="0">
+                <a:solidFill>
+                  <a:schemeClr val="tx1"/>
+                </a:solidFill>
+              </a:rPr>
+              <a:t>ReduceRight</a:t>
+            </a:r>
+            <a:endParaRPr lang="ko-KR" altLang="en-US" sz="1400" dirty="0">
+              <a:solidFill>
+                <a:schemeClr val="tx1"/>
+              </a:solidFill>
+            </a:endParaRPr>
+          </a:p>
+        </p:txBody>
+      </p:sp>
+      <p:sp>
+        <p:nvSpPr>
+          <p:cNvPr id="6" name="직사각형 5"/>
+          <p:cNvSpPr/>
+          <p:nvPr/>
+        </p:nvSpPr>
+        <p:spPr>
+          <a:xfrm>
+            <a:off x="4860032" y="5949280"/>
+            <a:ext cx="1944216" cy="576064"/>
+          </a:xfrm>
+          <a:prstGeom prst="rect">
+            <a:avLst/>
+          </a:prstGeom>
+          <a:solidFill>
+            <a:schemeClr val="bg1"/>
+          </a:solidFill>
+          <a:ln>
+            <a:solidFill>
+              <a:schemeClr val="tx1"/>
+            </a:solidFill>
+          </a:ln>
+        </p:spPr>
+        <p:style>
+          <a:lnRef idx="2">
+            <a:schemeClr val="accent1">
+              <a:shade val="50000"/>
+            </a:schemeClr>
+          </a:lnRef>
+          <a:fillRef idx="1">
+            <a:schemeClr val="accent1"/>
+          </a:fillRef>
+          <a:effectRef idx="0">
+            <a:schemeClr val="accent1"/>
+          </a:effectRef>
+          <a:fontRef idx="minor">
+            <a:schemeClr val="lt1"/>
+          </a:fontRef>
+        </p:style>
+        <p:txBody>
+          <a:bodyPr lIns="72000" rIns="72000" rtlCol="0" anchor="ctr"/>
+          <a:lstStyle/>
+          <a:p>
+            <a:pPr algn="ctr"/>
+            <a:r>
+              <a:rPr lang="en-US" altLang="ko-KR" sz="1400" dirty="0" err="1" smtClean="0">
+                <a:solidFill>
+                  <a:schemeClr val="tx1"/>
+                </a:solidFill>
+              </a:rPr>
+              <a:t>FoldRight</a:t>
+            </a:r>
+            <a:endParaRPr lang="ko-KR" altLang="en-US" sz="1400" dirty="0">
+              <a:solidFill>
+                <a:schemeClr val="tx1"/>
+              </a:solidFill>
+            </a:endParaRPr>
+          </a:p>
+        </p:txBody>
+      </p:sp>
+    </p:spTree>
+    <p:extLst>
+      <p:ext uri="{BB962C8B-B14F-4D97-AF65-F5344CB8AC3E}">
+        <p14:creationId xmlns:p14="http://schemas.microsoft.com/office/powerpoint/2010/main" val="1073433339"/>
+      </p:ext>
+    </p:extLst>
+  </p:cSld>
+  <p:clrMapOvr>
+    <a:masterClrMapping/>
+  </p:clrMapOvr>
+</p:sld>
+</file>
+
+<file path=ppt/slides/slide41.xml><?xml version="1.0" encoding="utf-8"?>
+<p:sld xmlns:a="http://schemas.openxmlformats.org/drawingml/2006/main" xmlns:r="http://schemas.openxmlformats.org/officeDocument/2006/relationships" xmlns:p="http://schemas.openxmlformats.org/presentationml/2006/main">
+  <p:cSld>
+    <p:spTree>
+      <p:nvGrpSpPr>
+        <p:cNvPr id="1" name=""/>
+        <p:cNvGrpSpPr/>
+        <p:nvPr/>
+      </p:nvGrpSpPr>
+      <p:grpSpPr>
+        <a:xfrm>
+          <a:off x="0" y="0"/>
+          <a:ext cx="0" cy="0"/>
+          <a:chOff x="0" y="0"/>
+          <a:chExt cx="0" cy="0"/>
+        </a:xfrm>
+      </p:grpSpPr>
+      <p:sp>
+        <p:nvSpPr>
+          <p:cNvPr id="2" name="제목 1"/>
+          <p:cNvSpPr>
+            <a:spLocks noGrp="1"/>
+          </p:cNvSpPr>
+          <p:nvPr>
+            <p:ph type="title"/>
+          </p:nvPr>
+        </p:nvSpPr>
+        <p:spPr/>
+        <p:txBody>
+          <a:bodyPr/>
+          <a:lstStyle/>
+          <a:p>
+            <a:r>
+              <a:rPr lang="en-US" altLang="ko-KR" dirty="0" err="1" smtClean="0"/>
+              <a:t>FoldRight</a:t>
+            </a:r>
+            <a:r>
+              <a:rPr lang="en-US" altLang="ko-KR" dirty="0" smtClean="0"/>
+              <a:t> </a:t>
+            </a:r>
+            <a:r>
+              <a:rPr lang="ko-KR" altLang="en-US" dirty="0" smtClean="0"/>
+              <a:t>연습문제</a:t>
+            </a:r>
+            <a:endParaRPr lang="ko-KR" altLang="en-US" dirty="0"/>
+          </a:p>
+        </p:txBody>
+      </p:sp>
+      <p:pic>
+        <p:nvPicPr>
+          <p:cNvPr id="5122" name="Picture 2"/>
+          <p:cNvPicPr>
+            <a:picLocks noGrp="1" noChangeAspect="1" noChangeArrowheads="1"/>
+          </p:cNvPicPr>
+          <p:nvPr>
+            <p:ph idx="1"/>
+          </p:nvPr>
+        </p:nvPicPr>
+        <p:blipFill>
+          <a:blip r:embed="rId2">
+            <a:extLst>
+              <a:ext uri="{28A0092B-C50C-407E-A947-70E740481C1C}">
+                <a14:useLocalDpi xmlns:a14="http://schemas.microsoft.com/office/drawing/2010/main" val="0"/>
+              </a:ext>
+            </a:extLst>
+          </a:blip>
+          <a:srcRect/>
+          <a:stretch>
+            <a:fillRect/>
+          </a:stretch>
+        </p:blipFill>
+        <p:spPr bwMode="auto">
+          <a:xfrm>
+            <a:off x="1052512" y="1556792"/>
+            <a:ext cx="7038975" cy="2419350"/>
+          </a:xfrm>
+          <a:prstGeom prst="rect">
+            <a:avLst/>
+          </a:prstGeom>
+          <a:noFill/>
+          <a:ln>
+            <a:noFill/>
+          </a:ln>
+          <a:extLst>
+            <a:ext uri="{909E8E84-426E-40DD-AFC4-6F175D3DCCD1}">
+              <a14:hiddenFill xmlns:a14="http://schemas.microsoft.com/office/drawing/2010/main">
+                <a:solidFill>
+                  <a:schemeClr val="accent1"/>
+                </a:solidFill>
+              </a14:hiddenFill>
+            </a:ext>
+            <a:ext uri="{91240B29-F687-4F45-9708-019B960494DF}">
+              <a14:hiddenLine xmlns:a14="http://schemas.microsoft.com/office/drawing/2010/main" w="9525">
+                <a:solidFill>
+                  <a:schemeClr val="tx1"/>
+                </a:solidFill>
+                <a:miter lim="800000"/>
+                <a:headEnd/>
+                <a:tailEnd/>
+              </a14:hiddenLine>
+            </a:ext>
+          </a:extLst>
+        </p:spPr>
+      </p:pic>
+      <p:pic>
+        <p:nvPicPr>
+          <p:cNvPr id="5123" name="Picture 3"/>
+          <p:cNvPicPr>
+            <a:picLocks noChangeAspect="1" noChangeArrowheads="1"/>
+          </p:cNvPicPr>
+          <p:nvPr/>
+        </p:nvPicPr>
+        <p:blipFill>
+          <a:blip r:embed="rId3">
+            <a:extLst>
+              <a:ext uri="{28A0092B-C50C-407E-A947-70E740481C1C}">
+                <a14:useLocalDpi xmlns:a14="http://schemas.microsoft.com/office/drawing/2010/main" val="0"/>
+              </a:ext>
+            </a:extLst>
+          </a:blip>
+          <a:srcRect/>
+          <a:stretch>
+            <a:fillRect/>
+          </a:stretch>
+        </p:blipFill>
+        <p:spPr bwMode="auto">
+          <a:xfrm>
+            <a:off x="6372200" y="4405108"/>
+            <a:ext cx="1944216" cy="2120236"/>
+          </a:xfrm>
+          <a:prstGeom prst="rect">
+            <a:avLst/>
+          </a:prstGeom>
+          <a:noFill/>
+          <a:ln>
+            <a:noFill/>
+          </a:ln>
+          <a:extLst>
+            <a:ext uri="{909E8E84-426E-40DD-AFC4-6F175D3DCCD1}">
+              <a14:hiddenFill xmlns:a14="http://schemas.microsoft.com/office/drawing/2010/main">
+                <a:solidFill>
+                  <a:schemeClr val="accent1"/>
+                </a:solidFill>
+              </a14:hiddenFill>
+            </a:ext>
+            <a:ext uri="{91240B29-F687-4F45-9708-019B960494DF}">
+              <a14:hiddenLine xmlns:a14="http://schemas.microsoft.com/office/drawing/2010/main" w="9525">
+                <a:solidFill>
+                  <a:schemeClr val="tx1"/>
+                </a:solidFill>
+                <a:miter lim="800000"/>
+                <a:headEnd/>
+                <a:tailEnd/>
+              </a14:hiddenLine>
+            </a:ext>
+          </a:extLst>
+        </p:spPr>
+      </p:pic>
+      <p:sp>
+        <p:nvSpPr>
+          <p:cNvPr id="4" name="아래쪽 화살표 3"/>
+          <p:cNvSpPr/>
+          <p:nvPr/>
+        </p:nvSpPr>
+        <p:spPr>
+          <a:xfrm>
+            <a:off x="6732240" y="3717032"/>
+            <a:ext cx="396044" cy="288032"/>
+          </a:xfrm>
+          <a:prstGeom prst="downArrow">
+            <a:avLst/>
+          </a:prstGeom>
+          <a:solidFill>
+            <a:schemeClr val="bg1"/>
+          </a:solidFill>
+          <a:ln>
+            <a:solidFill>
+              <a:schemeClr val="tx1"/>
+            </a:solidFill>
+          </a:ln>
+        </p:spPr>
+        <p:style>
+          <a:lnRef idx="2">
+            <a:schemeClr val="accent1">
+              <a:shade val="50000"/>
+            </a:schemeClr>
+          </a:lnRef>
+          <a:fillRef idx="1">
+            <a:schemeClr val="accent1"/>
+          </a:fillRef>
+          <a:effectRef idx="0">
+            <a:schemeClr val="accent1"/>
+          </a:effectRef>
+          <a:fontRef idx="minor">
+            <a:schemeClr val="lt1"/>
+          </a:fontRef>
+        </p:style>
+        <p:txBody>
+          <a:bodyPr lIns="72000" rIns="72000" rtlCol="0" anchor="ctr"/>
+          <a:lstStyle/>
+          <a:p>
+            <a:pPr algn="ctr"/>
+            <a:endParaRPr lang="ko-KR" altLang="en-US" sz="1400" dirty="0">
+              <a:solidFill>
+                <a:schemeClr val="tx1"/>
+              </a:solidFill>
+            </a:endParaRPr>
+          </a:p>
+        </p:txBody>
+      </p:sp>
+    </p:spTree>
+    <p:extLst>
+      <p:ext uri="{BB962C8B-B14F-4D97-AF65-F5344CB8AC3E}">
+        <p14:creationId xmlns:p14="http://schemas.microsoft.com/office/powerpoint/2010/main" val="2911979162"/>
+      </p:ext>
+    </p:extLst>
+  </p:cSld>
+  <p:clrMapOvr>
+    <a:masterClrMapping/>
+  </p:clrMapOvr>
+</p:sld>
+</file>
+
+<file path=ppt/slides/slide42.xml><?xml version="1.0" encoding="utf-8"?>
+<p:sld xmlns:a="http://schemas.openxmlformats.org/drawingml/2006/main" xmlns:r="http://schemas.openxmlformats.org/officeDocument/2006/relationships" xmlns:p="http://schemas.openxmlformats.org/presentationml/2006/main">
+  <p:cSld>
+    <p:spTree>
+      <p:nvGrpSpPr>
+        <p:cNvPr id="1" name=""/>
+        <p:cNvGrpSpPr/>
+        <p:nvPr/>
+      </p:nvGrpSpPr>
+      <p:grpSpPr>
+        <a:xfrm>
+          <a:off x="0" y="0"/>
+          <a:ext cx="0" cy="0"/>
+          <a:chOff x="0" y="0"/>
+          <a:chExt cx="0" cy="0"/>
+        </a:xfrm>
+      </p:grpSpPr>
+      <p:sp>
+        <p:nvSpPr>
+          <p:cNvPr id="2" name="제목 1"/>
+          <p:cNvSpPr>
+            <a:spLocks noGrp="1"/>
+          </p:cNvSpPr>
+          <p:nvPr>
+            <p:ph type="title"/>
+          </p:nvPr>
+        </p:nvSpPr>
+        <p:spPr/>
+        <p:txBody>
+          <a:bodyPr/>
+          <a:lstStyle/>
+          <a:p>
+            <a:r>
+              <a:rPr lang="en-US" altLang="ko-KR" dirty="0" smtClean="0"/>
+              <a:t>Vector</a:t>
+            </a:r>
+            <a:r>
+              <a:rPr lang="ko-KR" altLang="en-US" dirty="0" smtClean="0"/>
+              <a:t>의 구조 도식</a:t>
+            </a:r>
+            <a:r>
+              <a:rPr lang="ko-KR" altLang="en-US" dirty="0"/>
+              <a:t>화</a:t>
+            </a:r>
+          </a:p>
+        </p:txBody>
+      </p:sp>
+      <p:pic>
+        <p:nvPicPr>
+          <p:cNvPr id="6146" name="Picture 2"/>
+          <p:cNvPicPr>
+            <a:picLocks noGrp="1" noChangeAspect="1" noChangeArrowheads="1"/>
+          </p:cNvPicPr>
+          <p:nvPr>
+            <p:ph idx="1"/>
+          </p:nvPr>
+        </p:nvPicPr>
+        <p:blipFill>
+          <a:blip r:embed="rId2">
+            <a:extLst>
+              <a:ext uri="{28A0092B-C50C-407E-A947-70E740481C1C}">
+                <a14:useLocalDpi xmlns:a14="http://schemas.microsoft.com/office/drawing/2010/main" val="0"/>
+              </a:ext>
+            </a:extLst>
+          </a:blip>
+          <a:srcRect/>
+          <a:stretch>
+            <a:fillRect/>
+          </a:stretch>
+        </p:blipFill>
+        <p:spPr bwMode="auto">
+          <a:xfrm>
+            <a:off x="1123950" y="1686719"/>
+            <a:ext cx="6896100" cy="4352925"/>
+          </a:xfrm>
+          <a:prstGeom prst="rect">
+            <a:avLst/>
+          </a:prstGeom>
+          <a:noFill/>
+          <a:ln>
+            <a:noFill/>
+          </a:ln>
+          <a:extLst>
+            <a:ext uri="{909E8E84-426E-40DD-AFC4-6F175D3DCCD1}">
+              <a14:hiddenFill xmlns:a14="http://schemas.microsoft.com/office/drawing/2010/main">
+                <a:solidFill>
+                  <a:schemeClr val="accent1"/>
+                </a:solidFill>
+              </a14:hiddenFill>
+            </a:ext>
+            <a:ext uri="{91240B29-F687-4F45-9708-019B960494DF}">
+              <a14:hiddenLine xmlns:a14="http://schemas.microsoft.com/office/drawing/2010/main" w="9525">
+                <a:solidFill>
+                  <a:schemeClr val="tx1"/>
+                </a:solidFill>
+                <a:miter lim="800000"/>
+                <a:headEnd/>
+                <a:tailEnd/>
+              </a14:hiddenLine>
+            </a:ext>
+          </a:extLst>
+        </p:spPr>
+      </p:pic>
+    </p:spTree>
+    <p:extLst>
+      <p:ext uri="{BB962C8B-B14F-4D97-AF65-F5344CB8AC3E}">
+        <p14:creationId xmlns:p14="http://schemas.microsoft.com/office/powerpoint/2010/main" val="3455790581"/>
+      </p:ext>
+    </p:extLst>
+  </p:cSld>
+  <p:clrMapOvr>
+    <a:masterClrMapping/>
+  </p:clrMapOvr>
+</p:sld>
+</file>
+
+<file path=ppt/slides/slide43.xml><?xml version="1.0" encoding="utf-8"?>
+<p:sld xmlns:a="http://schemas.openxmlformats.org/drawingml/2006/main" xmlns:r="http://schemas.openxmlformats.org/officeDocument/2006/relationships" xmlns:p="http://schemas.openxmlformats.org/presentationml/2006/main">
+  <p:cSld>
+    <p:spTree>
+      <p:nvGrpSpPr>
+        <p:cNvPr id="1" name=""/>
+        <p:cNvGrpSpPr/>
+        <p:nvPr/>
+      </p:nvGrpSpPr>
+      <p:grpSpPr>
+        <a:xfrm>
+          <a:off x="0" y="0"/>
+          <a:ext cx="0" cy="0"/>
+          <a:chOff x="0" y="0"/>
+          <a:chExt cx="0" cy="0"/>
+        </a:xfrm>
+      </p:grpSpPr>
+      <p:sp>
+        <p:nvSpPr>
+          <p:cNvPr id="2" name="제목 1"/>
+          <p:cNvSpPr>
+            <a:spLocks noGrp="1"/>
+          </p:cNvSpPr>
+          <p:nvPr>
+            <p:ph type="title"/>
+          </p:nvPr>
+        </p:nvSpPr>
+        <p:spPr/>
+        <p:txBody>
+          <a:bodyPr/>
+          <a:lstStyle/>
+          <a:p>
+            <a:endParaRPr lang="ko-KR" altLang="en-US"/>
+          </a:p>
+        </p:txBody>
+      </p:sp>
+      <p:pic>
+        <p:nvPicPr>
+          <p:cNvPr id="7172" name="Picture 4"/>
+          <p:cNvPicPr>
+            <a:picLocks noGrp="1" noChangeAspect="1" noChangeArrowheads="1"/>
+          </p:cNvPicPr>
+          <p:nvPr>
+            <p:ph idx="1"/>
+          </p:nvPr>
+        </p:nvPicPr>
+        <p:blipFill>
+          <a:blip r:embed="rId2">
+            <a:extLst>
+              <a:ext uri="{28A0092B-C50C-407E-A947-70E740481C1C}">
+                <a14:useLocalDpi xmlns:a14="http://schemas.microsoft.com/office/drawing/2010/main" val="0"/>
+              </a:ext>
+            </a:extLst>
+          </a:blip>
+          <a:srcRect/>
+          <a:stretch>
+            <a:fillRect/>
+          </a:stretch>
+        </p:blipFill>
+        <p:spPr bwMode="auto">
+          <a:xfrm>
+            <a:off x="866775" y="2015331"/>
+            <a:ext cx="7410450" cy="3695700"/>
+          </a:xfrm>
+          <a:prstGeom prst="rect">
+            <a:avLst/>
+          </a:prstGeom>
+          <a:noFill/>
+          <a:ln>
+            <a:noFill/>
+          </a:ln>
+          <a:extLst>
+            <a:ext uri="{909E8E84-426E-40DD-AFC4-6F175D3DCCD1}">
+              <a14:hiddenFill xmlns:a14="http://schemas.microsoft.com/office/drawing/2010/main">
+                <a:solidFill>
+                  <a:schemeClr val="accent1"/>
+                </a:solidFill>
+              </a14:hiddenFill>
+            </a:ext>
+            <a:ext uri="{91240B29-F687-4F45-9708-019B960494DF}">
+              <a14:hiddenLine xmlns:a14="http://schemas.microsoft.com/office/drawing/2010/main" w="9525">
+                <a:solidFill>
+                  <a:schemeClr val="tx1"/>
+                </a:solidFill>
+                <a:miter lim="800000"/>
+                <a:headEnd/>
+                <a:tailEnd/>
+              </a14:hiddenLine>
+            </a:ext>
+          </a:extLst>
+        </p:spPr>
+      </p:pic>
+    </p:spTree>
+    <p:extLst>
+      <p:ext uri="{BB962C8B-B14F-4D97-AF65-F5344CB8AC3E}">
+        <p14:creationId xmlns:p14="http://schemas.microsoft.com/office/powerpoint/2010/main" val="858173119"/>
       </p:ext>
     </p:extLst>
   </p:cSld>

</xml_diff>

<commit_message>
week 6-3 for comprehension 에 대한 이해
</commit_message>
<xml_diff>
--- a/doc/Cousera_Functional Programming parctice.pptx
+++ b/doc/Cousera_Functional Programming parctice.pptx
@@ -48,6 +48,7 @@
     <p:sldId id="296" r:id="rId42"/>
     <p:sldId id="297" r:id="rId43"/>
     <p:sldId id="298" r:id="rId44"/>
+    <p:sldId id="299" r:id="rId45"/>
   </p:sldIdLst>
   <p:sldSz cx="9144000" cy="6858000" type="screen4x3"/>
   <p:notesSz cx="6858000" cy="9144000"/>
@@ -330,7 +331,7 @@
           <a:p>
             <a:fld id="{7035F8CA-3E03-40E9-91B9-44BB9DCBBB8B}" type="datetimeFigureOut">
               <a:rPr lang="ko-KR" altLang="en-US" smtClean="0"/>
-              <a:t>2016-08-05</a:t>
+              <a:t>2016-08-09</a:t>
             </a:fld>
             <a:endParaRPr lang="ko-KR" altLang="en-US"/>
           </a:p>
@@ -500,7 +501,7 @@
           <a:p>
             <a:fld id="{7035F8CA-3E03-40E9-91B9-44BB9DCBBB8B}" type="datetimeFigureOut">
               <a:rPr lang="ko-KR" altLang="en-US" smtClean="0"/>
-              <a:t>2016-08-05</a:t>
+              <a:t>2016-08-09</a:t>
             </a:fld>
             <a:endParaRPr lang="ko-KR" altLang="en-US"/>
           </a:p>
@@ -680,7 +681,7 @@
           <a:p>
             <a:fld id="{7035F8CA-3E03-40E9-91B9-44BB9DCBBB8B}" type="datetimeFigureOut">
               <a:rPr lang="ko-KR" altLang="en-US" smtClean="0"/>
-              <a:t>2016-08-05</a:t>
+              <a:t>2016-08-09</a:t>
             </a:fld>
             <a:endParaRPr lang="ko-KR" altLang="en-US"/>
           </a:p>
@@ -850,7 +851,7 @@
           <a:p>
             <a:fld id="{7035F8CA-3E03-40E9-91B9-44BB9DCBBB8B}" type="datetimeFigureOut">
               <a:rPr lang="ko-KR" altLang="en-US" smtClean="0"/>
-              <a:t>2016-08-05</a:t>
+              <a:t>2016-08-09</a:t>
             </a:fld>
             <a:endParaRPr lang="ko-KR" altLang="en-US"/>
           </a:p>
@@ -1096,7 +1097,7 @@
           <a:p>
             <a:fld id="{7035F8CA-3E03-40E9-91B9-44BB9DCBBB8B}" type="datetimeFigureOut">
               <a:rPr lang="ko-KR" altLang="en-US" smtClean="0"/>
-              <a:t>2016-08-05</a:t>
+              <a:t>2016-08-09</a:t>
             </a:fld>
             <a:endParaRPr lang="ko-KR" altLang="en-US"/>
           </a:p>
@@ -1384,7 +1385,7 @@
           <a:p>
             <a:fld id="{7035F8CA-3E03-40E9-91B9-44BB9DCBBB8B}" type="datetimeFigureOut">
               <a:rPr lang="ko-KR" altLang="en-US" smtClean="0"/>
-              <a:t>2016-08-05</a:t>
+              <a:t>2016-08-09</a:t>
             </a:fld>
             <a:endParaRPr lang="ko-KR" altLang="en-US"/>
           </a:p>
@@ -1806,7 +1807,7 @@
           <a:p>
             <a:fld id="{7035F8CA-3E03-40E9-91B9-44BB9DCBBB8B}" type="datetimeFigureOut">
               <a:rPr lang="ko-KR" altLang="en-US" smtClean="0"/>
-              <a:t>2016-08-05</a:t>
+              <a:t>2016-08-09</a:t>
             </a:fld>
             <a:endParaRPr lang="ko-KR" altLang="en-US"/>
           </a:p>
@@ -1924,7 +1925,7 @@
           <a:p>
             <a:fld id="{7035F8CA-3E03-40E9-91B9-44BB9DCBBB8B}" type="datetimeFigureOut">
               <a:rPr lang="ko-KR" altLang="en-US" smtClean="0"/>
-              <a:t>2016-08-05</a:t>
+              <a:t>2016-08-09</a:t>
             </a:fld>
             <a:endParaRPr lang="ko-KR" altLang="en-US"/>
           </a:p>
@@ -2019,7 +2020,7 @@
           <a:p>
             <a:fld id="{7035F8CA-3E03-40E9-91B9-44BB9DCBBB8B}" type="datetimeFigureOut">
               <a:rPr lang="ko-KR" altLang="en-US" smtClean="0"/>
-              <a:t>2016-08-05</a:t>
+              <a:t>2016-08-09</a:t>
             </a:fld>
             <a:endParaRPr lang="ko-KR" altLang="en-US"/>
           </a:p>
@@ -2296,7 +2297,7 @@
           <a:p>
             <a:fld id="{7035F8CA-3E03-40E9-91B9-44BB9DCBBB8B}" type="datetimeFigureOut">
               <a:rPr lang="ko-KR" altLang="en-US" smtClean="0"/>
-              <a:t>2016-08-05</a:t>
+              <a:t>2016-08-09</a:t>
             </a:fld>
             <a:endParaRPr lang="ko-KR" altLang="en-US"/>
           </a:p>
@@ -2549,7 +2550,7 @@
           <a:p>
             <a:fld id="{7035F8CA-3E03-40E9-91B9-44BB9DCBBB8B}" type="datetimeFigureOut">
               <a:rPr lang="ko-KR" altLang="en-US" smtClean="0"/>
-              <a:t>2016-08-05</a:t>
+              <a:t>2016-08-09</a:t>
             </a:fld>
             <a:endParaRPr lang="ko-KR" altLang="en-US"/>
           </a:p>
@@ -2762,7 +2763,7 @@
           <a:p>
             <a:fld id="{7035F8CA-3E03-40E9-91B9-44BB9DCBBB8B}" type="datetimeFigureOut">
               <a:rPr lang="ko-KR" altLang="en-US" smtClean="0"/>
-              <a:t>2016-08-05</a:t>
+              <a:t>2016-08-09</a:t>
             </a:fld>
             <a:endParaRPr lang="ko-KR" altLang="en-US"/>
           </a:p>
@@ -9485,6 +9486,440 @@
     <p:extLst>
       <p:ext uri="{BB962C8B-B14F-4D97-AF65-F5344CB8AC3E}">
         <p14:creationId xmlns:p14="http://schemas.microsoft.com/office/powerpoint/2010/main" val="858173119"/>
+      </p:ext>
+    </p:extLst>
+  </p:cSld>
+  <p:clrMapOvr>
+    <a:masterClrMapping/>
+  </p:clrMapOvr>
+</p:sld>
+</file>
+
+<file path=ppt/slides/slide44.xml><?xml version="1.0" encoding="utf-8"?>
+<p:sld xmlns:a="http://schemas.openxmlformats.org/drawingml/2006/main" xmlns:r="http://schemas.openxmlformats.org/officeDocument/2006/relationships" xmlns:p="http://schemas.openxmlformats.org/presentationml/2006/main">
+  <p:cSld>
+    <p:spTree>
+      <p:nvGrpSpPr>
+        <p:cNvPr id="1" name=""/>
+        <p:cNvGrpSpPr/>
+        <p:nvPr/>
+      </p:nvGrpSpPr>
+      <p:grpSpPr>
+        <a:xfrm>
+          <a:off x="0" y="0"/>
+          <a:ext cx="0" cy="0"/>
+          <a:chOff x="0" y="0"/>
+          <a:chExt cx="0" cy="0"/>
+        </a:xfrm>
+      </p:grpSpPr>
+      <p:sp>
+        <p:nvSpPr>
+          <p:cNvPr id="2" name="제목 1"/>
+          <p:cNvSpPr>
+            <a:spLocks noGrp="1"/>
+          </p:cNvSpPr>
+          <p:nvPr>
+            <p:ph type="title"/>
+          </p:nvPr>
+        </p:nvSpPr>
+        <p:spPr/>
+        <p:txBody>
+          <a:bodyPr/>
+          <a:lstStyle/>
+          <a:p>
+            <a:endParaRPr lang="ko-KR" altLang="en-US"/>
+          </a:p>
+        </p:txBody>
+      </p:sp>
+      <p:pic>
+        <p:nvPicPr>
+          <p:cNvPr id="1026" name="Picture 2"/>
+          <p:cNvPicPr>
+            <a:picLocks noGrp="1" noChangeAspect="1" noChangeArrowheads="1"/>
+          </p:cNvPicPr>
+          <p:nvPr>
+            <p:ph idx="1"/>
+          </p:nvPr>
+        </p:nvPicPr>
+        <p:blipFill>
+          <a:blip r:embed="rId2">
+            <a:extLst>
+              <a:ext uri="{28A0092B-C50C-407E-A947-70E740481C1C}">
+                <a14:useLocalDpi xmlns:a14="http://schemas.microsoft.com/office/drawing/2010/main" val="0"/>
+              </a:ext>
+            </a:extLst>
+          </a:blip>
+          <a:srcRect/>
+          <a:stretch>
+            <a:fillRect/>
+          </a:stretch>
+        </p:blipFill>
+        <p:spPr bwMode="auto">
+          <a:xfrm>
+            <a:off x="914400" y="2082006"/>
+            <a:ext cx="7315200" cy="3562350"/>
+          </a:xfrm>
+          <a:prstGeom prst="rect">
+            <a:avLst/>
+          </a:prstGeom>
+          <a:noFill/>
+          <a:ln>
+            <a:noFill/>
+          </a:ln>
+          <a:extLst>
+            <a:ext uri="{909E8E84-426E-40DD-AFC4-6F175D3DCCD1}">
+              <a14:hiddenFill xmlns:a14="http://schemas.microsoft.com/office/drawing/2010/main">
+                <a:solidFill>
+                  <a:schemeClr val="accent1"/>
+                </a:solidFill>
+              </a14:hiddenFill>
+            </a:ext>
+            <a:ext uri="{91240B29-F687-4F45-9708-019B960494DF}">
+              <a14:hiddenLine xmlns:a14="http://schemas.microsoft.com/office/drawing/2010/main" w="9525">
+                <a:solidFill>
+                  <a:schemeClr val="tx1"/>
+                </a:solidFill>
+                <a:miter lim="800000"/>
+                <a:headEnd/>
+                <a:tailEnd/>
+              </a14:hiddenLine>
+            </a:ext>
+          </a:extLst>
+        </p:spPr>
+      </p:pic>
+      <p:pic>
+        <p:nvPicPr>
+          <p:cNvPr id="1028" name="Picture 4"/>
+          <p:cNvPicPr>
+            <a:picLocks noChangeAspect="1" noChangeArrowheads="1"/>
+          </p:cNvPicPr>
+          <p:nvPr/>
+        </p:nvPicPr>
+        <p:blipFill>
+          <a:blip r:embed="rId3">
+            <a:extLst>
+              <a:ext uri="{28A0092B-C50C-407E-A947-70E740481C1C}">
+                <a14:useLocalDpi xmlns:a14="http://schemas.microsoft.com/office/drawing/2010/main" val="0"/>
+              </a:ext>
+            </a:extLst>
+          </a:blip>
+          <a:srcRect/>
+          <a:stretch>
+            <a:fillRect/>
+          </a:stretch>
+        </p:blipFill>
+        <p:spPr bwMode="auto">
+          <a:xfrm>
+            <a:off x="7452320" y="4509120"/>
+            <a:ext cx="1586336" cy="2216621"/>
+          </a:xfrm>
+          <a:prstGeom prst="rect">
+            <a:avLst/>
+          </a:prstGeom>
+          <a:noFill/>
+          <a:ln>
+            <a:noFill/>
+          </a:ln>
+          <a:extLst>
+            <a:ext uri="{909E8E84-426E-40DD-AFC4-6F175D3DCCD1}">
+              <a14:hiddenFill xmlns:a14="http://schemas.microsoft.com/office/drawing/2010/main">
+                <a:solidFill>
+                  <a:schemeClr val="accent1"/>
+                </a:solidFill>
+              </a14:hiddenFill>
+            </a:ext>
+            <a:ext uri="{91240B29-F687-4F45-9708-019B960494DF}">
+              <a14:hiddenLine xmlns:a14="http://schemas.microsoft.com/office/drawing/2010/main" w="9525">
+                <a:solidFill>
+                  <a:schemeClr val="tx1"/>
+                </a:solidFill>
+                <a:miter lim="800000"/>
+                <a:headEnd/>
+                <a:tailEnd/>
+              </a14:hiddenLine>
+            </a:ext>
+          </a:extLst>
+        </p:spPr>
+      </p:pic>
+      <p:sp>
+        <p:nvSpPr>
+          <p:cNvPr id="4" name="아래쪽 화살표 3"/>
+          <p:cNvSpPr/>
+          <p:nvPr/>
+        </p:nvSpPr>
+        <p:spPr>
+          <a:xfrm>
+            <a:off x="7791793" y="4221088"/>
+            <a:ext cx="433128" cy="288032"/>
+          </a:xfrm>
+          <a:prstGeom prst="downArrow">
+            <a:avLst/>
+          </a:prstGeom>
+          <a:solidFill>
+            <a:schemeClr val="bg1"/>
+          </a:solidFill>
+          <a:ln>
+            <a:solidFill>
+              <a:schemeClr val="tx1"/>
+            </a:solidFill>
+          </a:ln>
+        </p:spPr>
+        <p:style>
+          <a:lnRef idx="2">
+            <a:schemeClr val="accent1">
+              <a:shade val="50000"/>
+            </a:schemeClr>
+          </a:lnRef>
+          <a:fillRef idx="1">
+            <a:schemeClr val="accent1"/>
+          </a:fillRef>
+          <a:effectRef idx="0">
+            <a:schemeClr val="accent1"/>
+          </a:effectRef>
+          <a:fontRef idx="minor">
+            <a:schemeClr val="lt1"/>
+          </a:fontRef>
+        </p:style>
+        <p:txBody>
+          <a:bodyPr lIns="72000" rIns="72000" rtlCol="0" anchor="ctr"/>
+          <a:lstStyle/>
+          <a:p>
+            <a:pPr algn="ctr"/>
+            <a:endParaRPr lang="ko-KR" altLang="en-US" sz="1400" dirty="0">
+              <a:solidFill>
+                <a:schemeClr val="tx1"/>
+              </a:solidFill>
+            </a:endParaRPr>
+          </a:p>
+        </p:txBody>
+      </p:sp>
+      <p:sp>
+        <p:nvSpPr>
+          <p:cNvPr id="5" name="TextBox 4"/>
+          <p:cNvSpPr txBox="1"/>
+          <p:nvPr/>
+        </p:nvSpPr>
+        <p:spPr>
+          <a:xfrm>
+            <a:off x="3419872" y="5617430"/>
+            <a:ext cx="3672408" cy="830997"/>
+          </a:xfrm>
+          <a:prstGeom prst="rect">
+            <a:avLst/>
+          </a:prstGeom>
+          <a:noFill/>
+        </p:spPr>
+        <p:txBody>
+          <a:bodyPr wrap="square" rtlCol="0">
+            <a:spAutoFit/>
+          </a:bodyPr>
+          <a:lstStyle/>
+          <a:p>
+            <a:r>
+              <a:rPr lang="en-US" altLang="ko-KR" sz="1200" b="1" dirty="0" smtClean="0"/>
+              <a:t>List (0, 3, 1)  </a:t>
+            </a:r>
+          </a:p>
+          <a:p>
+            <a:r>
+              <a:rPr lang="en-US" altLang="ko-KR" sz="1200" b="1" dirty="0" smtClean="0">
+                <a:sym typeface="Wingdings" panose="05000000000000000000" pitchFamily="2" charset="2"/>
+              </a:rPr>
+              <a:t>0 </a:t>
+            </a:r>
+            <a:r>
+              <a:rPr lang="en-US" altLang="ko-KR" sz="1200" b="1" dirty="0" smtClean="0">
+                <a:sym typeface="Wingdings" panose="05000000000000000000" pitchFamily="2" charset="2"/>
+              </a:rPr>
+              <a:t> Queen</a:t>
+            </a:r>
+            <a:r>
+              <a:rPr lang="ko-KR" altLang="en-US" sz="1200" b="1" dirty="0" smtClean="0">
+                <a:sym typeface="Wingdings" panose="05000000000000000000" pitchFamily="2" charset="2"/>
+              </a:rPr>
+              <a:t>이 </a:t>
+            </a:r>
+            <a:r>
+              <a:rPr lang="en-US" altLang="ko-KR" sz="1200" b="1" dirty="0" smtClean="0">
+                <a:sym typeface="Wingdings" panose="05000000000000000000" pitchFamily="2" charset="2"/>
+              </a:rPr>
+              <a:t>2</a:t>
+            </a:r>
+            <a:r>
+              <a:rPr lang="ko-KR" altLang="en-US" sz="1200" b="1" dirty="0" smtClean="0">
+                <a:sym typeface="Wingdings" panose="05000000000000000000" pitchFamily="2" charset="2"/>
+              </a:rPr>
+              <a:t>번째 </a:t>
+            </a:r>
+            <a:r>
+              <a:rPr lang="en-US" altLang="ko-KR" sz="1200" b="1" dirty="0" smtClean="0">
+                <a:sym typeface="Wingdings" panose="05000000000000000000" pitchFamily="2" charset="2"/>
+              </a:rPr>
+              <a:t>row</a:t>
+            </a:r>
+            <a:r>
+              <a:rPr lang="en-US" altLang="ko-KR" sz="1200" b="1" dirty="0">
+                <a:sym typeface="Wingdings" panose="05000000000000000000" pitchFamily="2" charset="2"/>
+              </a:rPr>
+              <a:t>,</a:t>
+            </a:r>
+            <a:r>
+              <a:rPr lang="ko-KR" altLang="en-US" sz="1200" b="1" dirty="0" smtClean="0">
+                <a:sym typeface="Wingdings" panose="05000000000000000000" pitchFamily="2" charset="2"/>
+              </a:rPr>
+              <a:t> </a:t>
+            </a:r>
+            <a:r>
+              <a:rPr lang="en-US" altLang="ko-KR" sz="1200" b="1" dirty="0" smtClean="0">
+                <a:sym typeface="Wingdings" panose="05000000000000000000" pitchFamily="2" charset="2"/>
+              </a:rPr>
+              <a:t>0</a:t>
+            </a:r>
+            <a:r>
+              <a:rPr lang="ko-KR" altLang="en-US" sz="1200" b="1" dirty="0" smtClean="0">
+                <a:sym typeface="Wingdings" panose="05000000000000000000" pitchFamily="2" charset="2"/>
+              </a:rPr>
+              <a:t>번째 </a:t>
+            </a:r>
+            <a:r>
+              <a:rPr lang="en-US" altLang="ko-KR" sz="1200" b="1" dirty="0" smtClean="0">
+                <a:sym typeface="Wingdings" panose="05000000000000000000" pitchFamily="2" charset="2"/>
+              </a:rPr>
+              <a:t>column</a:t>
+            </a:r>
+          </a:p>
+          <a:p>
+            <a:r>
+              <a:rPr lang="en-US" altLang="ko-KR" sz="1200" b="1" dirty="0" smtClean="0">
+                <a:sym typeface="Wingdings" panose="05000000000000000000" pitchFamily="2" charset="2"/>
+              </a:rPr>
+              <a:t>3  </a:t>
+            </a:r>
+            <a:r>
+              <a:rPr lang="en-US" altLang="ko-KR" sz="1200" b="1" dirty="0">
+                <a:sym typeface="Wingdings" panose="05000000000000000000" pitchFamily="2" charset="2"/>
+              </a:rPr>
+              <a:t>Queen</a:t>
+            </a:r>
+            <a:r>
+              <a:rPr lang="ko-KR" altLang="en-US" sz="1200" b="1" dirty="0">
+                <a:sym typeface="Wingdings" panose="05000000000000000000" pitchFamily="2" charset="2"/>
+              </a:rPr>
+              <a:t>이 </a:t>
+            </a:r>
+            <a:r>
+              <a:rPr lang="en-US" altLang="ko-KR" sz="1200" b="1" dirty="0" smtClean="0">
+                <a:sym typeface="Wingdings" panose="05000000000000000000" pitchFamily="2" charset="2"/>
+              </a:rPr>
+              <a:t>1</a:t>
+            </a:r>
+            <a:r>
+              <a:rPr lang="ko-KR" altLang="en-US" sz="1200" b="1" dirty="0" smtClean="0">
+                <a:sym typeface="Wingdings" panose="05000000000000000000" pitchFamily="2" charset="2"/>
+              </a:rPr>
+              <a:t>번째 </a:t>
+            </a:r>
+            <a:r>
+              <a:rPr lang="en-US" altLang="ko-KR" sz="1200" b="1" dirty="0">
+                <a:sym typeface="Wingdings" panose="05000000000000000000" pitchFamily="2" charset="2"/>
+              </a:rPr>
+              <a:t>row,</a:t>
+            </a:r>
+            <a:r>
+              <a:rPr lang="ko-KR" altLang="en-US" sz="1200" b="1" dirty="0">
+                <a:sym typeface="Wingdings" panose="05000000000000000000" pitchFamily="2" charset="2"/>
+              </a:rPr>
+              <a:t> </a:t>
+            </a:r>
+            <a:r>
+              <a:rPr lang="en-US" altLang="ko-KR" sz="1200" b="1" dirty="0" smtClean="0">
+                <a:sym typeface="Wingdings" panose="05000000000000000000" pitchFamily="2" charset="2"/>
+              </a:rPr>
+              <a:t>3</a:t>
+            </a:r>
+            <a:r>
+              <a:rPr lang="ko-KR" altLang="en-US" sz="1200" b="1" dirty="0" smtClean="0">
+                <a:sym typeface="Wingdings" panose="05000000000000000000" pitchFamily="2" charset="2"/>
+              </a:rPr>
+              <a:t>번째 </a:t>
+            </a:r>
+            <a:r>
+              <a:rPr lang="en-US" altLang="ko-KR" sz="1200" b="1" dirty="0" smtClean="0">
+                <a:sym typeface="Wingdings" panose="05000000000000000000" pitchFamily="2" charset="2"/>
+              </a:rPr>
+              <a:t>column</a:t>
+            </a:r>
+            <a:endParaRPr lang="en-US" altLang="ko-KR" sz="1200" b="1" dirty="0" smtClean="0"/>
+          </a:p>
+          <a:p>
+            <a:r>
+              <a:rPr lang="en-US" altLang="ko-KR" sz="1200" b="1" dirty="0" smtClean="0">
+                <a:sym typeface="Wingdings" panose="05000000000000000000" pitchFamily="2" charset="2"/>
+              </a:rPr>
+              <a:t>1 </a:t>
+            </a:r>
+            <a:r>
+              <a:rPr lang="en-US" altLang="ko-KR" sz="1200" b="1" dirty="0">
+                <a:sym typeface="Wingdings" panose="05000000000000000000" pitchFamily="2" charset="2"/>
+              </a:rPr>
+              <a:t> Queen</a:t>
+            </a:r>
+            <a:r>
+              <a:rPr lang="ko-KR" altLang="en-US" sz="1200" b="1" dirty="0">
+                <a:sym typeface="Wingdings" panose="05000000000000000000" pitchFamily="2" charset="2"/>
+              </a:rPr>
+              <a:t>이 </a:t>
+            </a:r>
+            <a:r>
+              <a:rPr lang="en-US" altLang="ko-KR" sz="1200" b="1" dirty="0" smtClean="0">
+                <a:sym typeface="Wingdings" panose="05000000000000000000" pitchFamily="2" charset="2"/>
+              </a:rPr>
+              <a:t>0</a:t>
+            </a:r>
+            <a:r>
+              <a:rPr lang="ko-KR" altLang="en-US" sz="1200" b="1" dirty="0" smtClean="0">
+                <a:sym typeface="Wingdings" panose="05000000000000000000" pitchFamily="2" charset="2"/>
+              </a:rPr>
+              <a:t>번째 </a:t>
+            </a:r>
+            <a:r>
+              <a:rPr lang="en-US" altLang="ko-KR" sz="1200" b="1" dirty="0">
+                <a:sym typeface="Wingdings" panose="05000000000000000000" pitchFamily="2" charset="2"/>
+              </a:rPr>
+              <a:t>row,</a:t>
+            </a:r>
+            <a:r>
+              <a:rPr lang="ko-KR" altLang="en-US" sz="1200" b="1" dirty="0">
+                <a:sym typeface="Wingdings" panose="05000000000000000000" pitchFamily="2" charset="2"/>
+              </a:rPr>
+              <a:t> </a:t>
+            </a:r>
+            <a:r>
+              <a:rPr lang="en-US" altLang="ko-KR" sz="1200" b="1" dirty="0" smtClean="0">
+                <a:sym typeface="Wingdings" panose="05000000000000000000" pitchFamily="2" charset="2"/>
+              </a:rPr>
+              <a:t>1</a:t>
+            </a:r>
+            <a:r>
+              <a:rPr lang="ko-KR" altLang="en-US" sz="1200" b="1" dirty="0" smtClean="0">
+                <a:sym typeface="Wingdings" panose="05000000000000000000" pitchFamily="2" charset="2"/>
+              </a:rPr>
+              <a:t>번째 </a:t>
+            </a:r>
+            <a:r>
+              <a:rPr lang="en-US" altLang="ko-KR" sz="1200" b="1" dirty="0" smtClean="0">
+                <a:sym typeface="Wingdings" panose="05000000000000000000" pitchFamily="2" charset="2"/>
+              </a:rPr>
+              <a:t>column</a:t>
+            </a:r>
+            <a:endParaRPr lang="ko-KR" altLang="en-US" sz="1200" b="1" dirty="0"/>
+          </a:p>
+        </p:txBody>
+      </p:sp>
+    </p:spTree>
+    <p:extLst>
+      <p:ext uri="{BB962C8B-B14F-4D97-AF65-F5344CB8AC3E}">
+        <p14:creationId xmlns:p14="http://schemas.microsoft.com/office/powerpoint/2010/main" val="2612836536"/>
       </p:ext>
     </p:extLst>
   </p:cSld>

</xml_diff>